<commit_message>
Updated poster. Added tables and more analysis
</commit_message>
<xml_diff>
--- a/Administrative/VTURCS/VTURCS Poster.pptx
+++ b/Administrative/VTURCS/VTURCS Poster.pptx
@@ -3328,7 +3328,7 @@
           <p:cNvPr id="6" name="TextBox 5">
             <a:extLst>
               <a:ext uri="{FF2B5EF4-FFF2-40B4-BE49-F238E27FC236}">
-                <a16:creationId xmlns:a16="http://schemas.microsoft.com/office/drawing/2014/main" xmlns="" id="{220E5D4F-743F-45D0-AFA7-111215743660}"/>
+                <a16:creationId xmlns:a16="http://schemas.microsoft.com/office/drawing/2014/main" id="{220E5D4F-743F-45D0-AFA7-111215743660}"/>
               </a:ext>
             </a:extLst>
           </p:cNvPr>
@@ -3337,8 +3337,8 @@
         </p:nvSpPr>
         <p:spPr>
           <a:xfrm>
-            <a:off x="1745723" y="4317145"/>
-            <a:ext cx="11449050" cy="3539430"/>
+            <a:off x="1590675" y="4082440"/>
+            <a:ext cx="11449050" cy="4431983"/>
           </a:xfrm>
           <a:prstGeom prst="rect">
             <a:avLst/>
@@ -3357,20 +3357,25 @@
           <a:lstStyle/>
           <a:p>
             <a:r>
-              <a:rPr lang="en-US" sz="8000" dirty="0"/>
+              <a:rPr lang="en-US" sz="5000" dirty="0"/>
               <a:t>Problem</a:t>
             </a:r>
             <a:r>
               <a:rPr lang="en-US" sz="7200" dirty="0"/>
               <a:t> </a:t>
             </a:r>
-          </a:p>
-          <a:p>
-            <a:pPr lvl="1"/>
-            <a:r>
-              <a:rPr lang="en-US" sz="4800" dirty="0"/>
-              <a:t>	Enrollments in CS Classes 	are Increasing and Many 	Departments Can't keep Up [NAS] </a:t>
-            </a:r>
+            <a:endParaRPr lang="en-US" sz="3000" dirty="0"/>
+          </a:p>
+          <a:p>
+            <a:r>
+              <a:rPr lang="en-US" sz="3000" dirty="0"/>
+              <a:t>Interest in computing is growing, leading to huge introductory computing class sizes [NAS]. Further, many assignments in these courses can be challenging for students, even when they only exercise a few concepts [RAINFAILL]. Worked Examples have shown promise as a scaffold to help students complete programming assignments. However, there have been limited classroom studies to evaluate the effectiveness of  </a:t>
+            </a:r>
+            <a:r>
+              <a:rPr lang="en-US" sz="3000"/>
+              <a:t>Worked Examples.</a:t>
+            </a:r>
+            <a:endParaRPr lang="en-US" sz="3000" dirty="0"/>
           </a:p>
         </p:txBody>
       </p:sp>
@@ -3379,7 +3384,7 @@
           <p:cNvPr id="7" name="TextBox 6">
             <a:extLst>
               <a:ext uri="{FF2B5EF4-FFF2-40B4-BE49-F238E27FC236}">
-                <a16:creationId xmlns:a16="http://schemas.microsoft.com/office/drawing/2014/main" xmlns="" id="{5D8088D2-9A9E-420D-96CA-76F68CF80583}"/>
+                <a16:creationId xmlns:a16="http://schemas.microsoft.com/office/drawing/2014/main" id="{5D8088D2-9A9E-420D-96CA-76F68CF80583}"/>
               </a:ext>
             </a:extLst>
           </p:cNvPr>
@@ -3389,7 +3394,7 @@
         <p:spPr>
           <a:xfrm>
             <a:off x="4933950" y="962649"/>
-            <a:ext cx="32346900" cy="2739211"/>
+            <a:ext cx="32346900" cy="2246769"/>
           </a:xfrm>
           <a:prstGeom prst="rect">
             <a:avLst/>
@@ -3409,17 +3414,17 @@
           <a:p>
             <a:pPr algn="ctr"/>
             <a:r>
-              <a:rPr lang="en-US" sz="10000" dirty="0"/>
-              <a:t>Supplementing Introductory Material With Worked Examples</a:t>
+              <a:rPr lang="en-US" sz="8000" dirty="0"/>
+              <a:t>Supplementing Introductory Experiences With Worked Examples</a:t>
             </a:r>
           </a:p>
           <a:p>
             <a:pPr algn="ctr"/>
             <a:r>
-              <a:rPr lang="en-US" sz="6600" dirty="0"/>
-              <a:t>Michael Friend</a:t>
-            </a:r>
-            <a:endParaRPr lang="en-US" sz="6000" dirty="0"/>
+              <a:rPr lang="en-US" sz="6000" dirty="0"/>
+              <a:t>Michael Friend under direction from Austin Cory Bart</a:t>
+            </a:r>
+            <a:endParaRPr lang="en-US" sz="5400" dirty="0"/>
           </a:p>
         </p:txBody>
       </p:sp>
@@ -3428,7 +3433,7 @@
           <p:cNvPr id="9" name="TextBox 8">
             <a:extLst>
               <a:ext uri="{FF2B5EF4-FFF2-40B4-BE49-F238E27FC236}">
-                <a16:creationId xmlns:a16="http://schemas.microsoft.com/office/drawing/2014/main" xmlns="" id="{F1DC245A-4543-4110-ACB5-B8CC821BF575}"/>
+                <a16:creationId xmlns:a16="http://schemas.microsoft.com/office/drawing/2014/main" id="{F1DC245A-4543-4110-ACB5-B8CC821BF575}"/>
               </a:ext>
             </a:extLst>
           </p:cNvPr>
@@ -3437,8 +3442,8 @@
         </p:nvSpPr>
         <p:spPr>
           <a:xfrm>
-            <a:off x="14225587" y="4661830"/>
-            <a:ext cx="11944881" cy="8156079"/>
+            <a:off x="13884113" y="4072303"/>
+            <a:ext cx="11944881" cy="4339650"/>
           </a:xfrm>
           <a:prstGeom prst="rect">
             <a:avLst/>
@@ -3458,7 +3463,7 @@
           <a:p>
             <a:pPr algn="ctr"/>
             <a:r>
-              <a:rPr lang="en-US" sz="7200" u="sng" dirty="0"/>
+              <a:rPr lang="en-US" sz="5000" u="sng" dirty="0"/>
               <a:t>Hypothesis</a:t>
             </a:r>
             <a:r>
@@ -3469,18 +3474,14 @@
           <a:p>
             <a:pPr algn="ctr"/>
             <a:r>
-              <a:rPr lang="en-US" sz="4800" dirty="0"/>
-              <a:t>Adding worked examples related to difficult problems will improve understanding of both the problem and the concept</a:t>
+              <a:rPr lang="en-US" sz="3000" dirty="0"/>
+              <a:t>Adding worked examples related to difficult problems will improve understanding of the problems and their ability to program</a:t>
             </a:r>
           </a:p>
           <a:p>
             <a:pPr algn="ctr"/>
-            <a:endParaRPr lang="en-US" sz="4400" dirty="0"/>
-          </a:p>
-          <a:p>
-            <a:pPr algn="ctr"/>
-            <a:r>
-              <a:rPr lang="en-US" sz="7200" u="sng" dirty="0"/>
+            <a:r>
+              <a:rPr lang="en-US" sz="5000" u="sng" dirty="0"/>
               <a:t>Research Questions </a:t>
             </a:r>
           </a:p>
@@ -3490,16 +3491,8 @@
               <a:buChar char="•"/>
             </a:pPr>
             <a:r>
-              <a:rPr lang="en-US" sz="4800" dirty="0"/>
-              <a:t>Do WEs improve </a:t>
-            </a:r>
-            <a:r>
-              <a:rPr lang="en-US" sz="4800" dirty="0" smtClean="0"/>
-              <a:t>performance?</a:t>
-            </a:r>
-            <a:r>
-              <a:rPr lang="en-US" sz="4800" dirty="0"/>
-              <a:t>	</a:t>
+              <a:rPr lang="en-US" sz="3000" dirty="0"/>
+              <a:t>Do WEs improve performance?	</a:t>
             </a:r>
           </a:p>
           <a:p>
@@ -3508,18 +3501,9 @@
               <a:buChar char="•"/>
             </a:pPr>
             <a:r>
-              <a:rPr lang="en-US" sz="4800" dirty="0"/>
-              <a:t>Do students take advantage of </a:t>
-            </a:r>
-            <a:r>
-              <a:rPr lang="en-US" sz="4800" dirty="0"/>
-              <a:t>w</a:t>
-            </a:r>
-            <a:r>
-              <a:rPr lang="en-US" sz="4800" dirty="0" smtClean="0"/>
-              <a:t>orked examples?</a:t>
-            </a:r>
-            <a:endParaRPr lang="en-US" sz="4800" dirty="0"/>
+              <a:rPr lang="en-US" sz="3000" dirty="0"/>
+              <a:t>Do students take advantage of worked examples?</a:t>
+            </a:r>
           </a:p>
           <a:p>
             <a:pPr marL="571500" indent="-571500">
@@ -3527,14 +3511,9 @@
               <a:buChar char="•"/>
             </a:pPr>
             <a:r>
-              <a:rPr lang="en-US" sz="4800" dirty="0"/>
-              <a:t>Do students find WEs </a:t>
-            </a:r>
-            <a:r>
-              <a:rPr lang="en-US" sz="4800" dirty="0" smtClean="0"/>
-              <a:t>helpful?</a:t>
-            </a:r>
-            <a:endParaRPr lang="en-US" sz="4800" dirty="0"/>
+              <a:rPr lang="en-US" sz="3000" dirty="0"/>
+              <a:t>Do students find WEs helpful?</a:t>
+            </a:r>
           </a:p>
         </p:txBody>
       </p:sp>
@@ -3543,7 +3522,7 @@
           <p:cNvPr id="10" name="TextBox 9">
             <a:extLst>
               <a:ext uri="{FF2B5EF4-FFF2-40B4-BE49-F238E27FC236}">
-                <a16:creationId xmlns:a16="http://schemas.microsoft.com/office/drawing/2014/main" xmlns="" id="{771BEF49-A5ED-4C7F-BE5F-1A7D07F00E97}"/>
+                <a16:creationId xmlns:a16="http://schemas.microsoft.com/office/drawing/2014/main" id="{771BEF49-A5ED-4C7F-BE5F-1A7D07F00E97}"/>
               </a:ext>
             </a:extLst>
           </p:cNvPr>
@@ -3552,8 +3531,8 @@
         </p:nvSpPr>
         <p:spPr>
           <a:xfrm>
-            <a:off x="27201282" y="4505146"/>
-            <a:ext cx="15754350" cy="6001643"/>
+            <a:off x="26180883" y="4074771"/>
+            <a:ext cx="15754350" cy="3477875"/>
           </a:xfrm>
           <a:prstGeom prst="rect">
             <a:avLst/>
@@ -3572,7 +3551,7 @@
           <a:lstStyle/>
           <a:p>
             <a:r>
-              <a:rPr lang="en-US" sz="7200" dirty="0"/>
+              <a:rPr lang="en-US" sz="5000" dirty="0"/>
               <a:t>Prior Work</a:t>
             </a:r>
           </a:p>
@@ -3582,12 +3561,21 @@
               <a:buChar char="•"/>
             </a:pPr>
             <a:r>
-              <a:rPr lang="en-US" sz="6000" dirty="0" err="1"/>
+              <a:rPr lang="en-US" sz="3000" dirty="0" err="1"/>
               <a:t>Subgoal</a:t>
             </a:r>
             <a:r>
-              <a:rPr lang="en-US" sz="6000" dirty="0"/>
+              <a:rPr lang="en-US" sz="3000" dirty="0"/>
               <a:t> Labels </a:t>
+            </a:r>
+          </a:p>
+          <a:p>
+            <a:endParaRPr lang="en-US" sz="3000" dirty="0"/>
+          </a:p>
+          <a:p>
+            <a:r>
+              <a:rPr lang="en-US" sz="5000" dirty="0"/>
+              <a:t>Educational Theories</a:t>
             </a:r>
           </a:p>
           <a:p>
@@ -3595,12 +3583,25 @@
               <a:buFont typeface="Arial" panose="020B0604020202020204" pitchFamily="34" charset="0"/>
               <a:buChar char="•"/>
             </a:pPr>
-            <a:endParaRPr lang="en-US" sz="6000" dirty="0"/>
-          </a:p>
-          <a:p>
-            <a:r>
-              <a:rPr lang="en-US" sz="7200" dirty="0"/>
-              <a:t>Educational Theories</a:t>
+            <a:r>
+              <a:rPr lang="en-US" sz="3000" dirty="0"/>
+              <a:t>Worked Examples[</a:t>
+            </a:r>
+            <a:r>
+              <a:rPr lang="en-US" sz="3000" dirty="0" err="1"/>
+              <a:t>Renkl</a:t>
+            </a:r>
+            <a:r>
+              <a:rPr lang="en-US" sz="3000" dirty="0"/>
+              <a:t>][</a:t>
+            </a:r>
+            <a:r>
+              <a:rPr lang="en-US" sz="3000" dirty="0" err="1"/>
+              <a:t>Sweller</a:t>
+            </a:r>
+            <a:r>
+              <a:rPr lang="en-US" sz="3000" dirty="0"/>
+              <a:t>]</a:t>
             </a:r>
           </a:p>
           <a:p>
@@ -3609,41 +3610,15 @@
               <a:buChar char="•"/>
             </a:pPr>
             <a:r>
-              <a:rPr lang="en-US" sz="6000" dirty="0"/>
-              <a:t>Worked Examples[</a:t>
-            </a:r>
-            <a:r>
-              <a:rPr lang="en-US" sz="6000" dirty="0" err="1"/>
-              <a:t>Renkl</a:t>
-            </a:r>
-            <a:r>
-              <a:rPr lang="en-US" sz="6000" dirty="0"/>
-              <a:t>][</a:t>
-            </a:r>
-            <a:r>
-              <a:rPr lang="en-US" sz="6000" dirty="0" err="1"/>
-              <a:t>Sweller</a:t>
-            </a:r>
-            <a:r>
-              <a:rPr lang="en-US" sz="6000" dirty="0"/>
-              <a:t>]</a:t>
-            </a:r>
-          </a:p>
-          <a:p>
-            <a:pPr marL="857250" indent="-857250">
-              <a:buFont typeface="Arial" panose="020B0604020202020204" pitchFamily="34" charset="0"/>
-              <a:buChar char="•"/>
-            </a:pPr>
-            <a:r>
-              <a:rPr lang="en-US" sz="6000" dirty="0"/>
+              <a:rPr lang="en-US" sz="3000" dirty="0"/>
               <a:t>Example-Problem Pairs[</a:t>
             </a:r>
             <a:r>
-              <a:rPr lang="en-US" sz="6000" dirty="0" err="1"/>
+              <a:rPr lang="en-US" sz="3000" dirty="0" err="1"/>
               <a:t>Skudder</a:t>
             </a:r>
             <a:r>
-              <a:rPr lang="en-US" sz="6000" dirty="0"/>
+              <a:rPr lang="en-US" sz="3000" dirty="0"/>
               <a:t>]</a:t>
             </a:r>
           </a:p>
@@ -3654,7 +3629,7 @@
           <p:cNvPr id="11" name="TextBox 10">
             <a:extLst>
               <a:ext uri="{FF2B5EF4-FFF2-40B4-BE49-F238E27FC236}">
-                <a16:creationId xmlns:a16="http://schemas.microsoft.com/office/drawing/2014/main" xmlns="" id="{AC39512E-6E7F-4CD4-BC56-DBD3595A1B9B}"/>
+                <a16:creationId xmlns:a16="http://schemas.microsoft.com/office/drawing/2014/main" id="{AC39512E-6E7F-4CD4-BC56-DBD3595A1B9B}"/>
               </a:ext>
             </a:extLst>
           </p:cNvPr>
@@ -3663,8 +3638,8 @@
         </p:nvSpPr>
         <p:spPr>
           <a:xfrm>
-            <a:off x="1857375" y="8854968"/>
-            <a:ext cx="11049000" cy="8586966"/>
+            <a:off x="990747" y="8706125"/>
+            <a:ext cx="10170883" cy="4571581"/>
           </a:xfrm>
           <a:prstGeom prst="rect">
             <a:avLst/>
@@ -3683,60 +3658,56 @@
           <a:lstStyle/>
           <a:p>
             <a:r>
+              <a:rPr lang="en-US" sz="5000" dirty="0"/>
+              <a:t>Context</a:t>
+            </a:r>
+            <a:r>
               <a:rPr lang="en-US" sz="7200" dirty="0"/>
-              <a:t>Context </a:t>
-            </a:r>
-          </a:p>
-          <a:p>
-            <a:pPr marL="857250" indent="-857250">
+              <a:t> </a:t>
+            </a:r>
+          </a:p>
+          <a:p>
+            <a:pPr marL="457200" indent="-457200">
               <a:buFont typeface="Arial" panose="020B0604020202020204" pitchFamily="34" charset="0"/>
               <a:buChar char="•"/>
             </a:pPr>
             <a:r>
-              <a:rPr lang="en-US" sz="6000" dirty="0"/>
-              <a:t>	Intro Programming for non-Majors</a:t>
-            </a:r>
-          </a:p>
-          <a:p>
-            <a:pPr marL="857250" indent="-857250">
+              <a:rPr lang="en-US" sz="3000" dirty="0"/>
+              <a:t>Introduction to Programming in Python</a:t>
+            </a:r>
+          </a:p>
+          <a:p>
+            <a:pPr marL="457200" indent="-457200">
               <a:buFont typeface="Arial" panose="020B0604020202020204" pitchFamily="34" charset="0"/>
               <a:buChar char="•"/>
             </a:pPr>
             <a:r>
-              <a:rPr lang="en-US" sz="6000" dirty="0"/>
-              <a:t> &lt;DEMOGRAPHIC DATA/CHARTS&gt;</a:t>
-            </a:r>
-          </a:p>
-          <a:p>
-            <a:pPr marL="1314450" lvl="1" indent="-857250">
+              <a:rPr lang="en-US" sz="3000" dirty="0"/>
+              <a:t>Non-CS majors from mostly Engineering and Sciences</a:t>
+            </a:r>
+          </a:p>
+          <a:p>
+            <a:pPr marL="457200" indent="-457200">
               <a:buFont typeface="Arial" panose="020B0604020202020204" pitchFamily="34" charset="0"/>
               <a:buChar char="•"/>
             </a:pPr>
             <a:r>
-              <a:rPr lang="en-US" sz="6000" dirty="0"/>
-              <a:t>Class size</a:t>
-            </a:r>
-          </a:p>
-          <a:p>
-            <a:pPr marL="1314450" lvl="1" indent="-857250">
+              <a:rPr lang="en-US" sz="3000" dirty="0"/>
+              <a:t>Students complete 188 programming assignments in and online programming environment </a:t>
+            </a:r>
+          </a:p>
+          <a:p>
+            <a:pPr marL="457200" indent="-457200">
               <a:buFont typeface="Arial" panose="020B0604020202020204" pitchFamily="34" charset="0"/>
               <a:buChar char="•"/>
             </a:pPr>
             <a:r>
-              <a:rPr lang="en-US" sz="6000" dirty="0"/>
-              <a:t>Gender breakdown</a:t>
-            </a:r>
-          </a:p>
-          <a:p>
-            <a:pPr marL="1314450" lvl="1" indent="-857250">
-              <a:buFont typeface="Arial" panose="020B0604020202020204" pitchFamily="34" charset="0"/>
-              <a:buChar char="•"/>
-            </a:pPr>
-            <a:r>
-              <a:rPr lang="en-US" sz="6000" dirty="0"/>
-              <a:t>Prior Experience and/or programming comfort</a:t>
-            </a:r>
-            <a:endParaRPr lang="en-US" sz="7200" dirty="0"/>
+              <a:rPr lang="en-US" sz="3000" dirty="0"/>
+              <a:t>Keystroke level edits and environmental interactions are logged</a:t>
+            </a:r>
+          </a:p>
+          <a:p>
+            <a:endParaRPr lang="en-US" sz="3000" dirty="0"/>
           </a:p>
         </p:txBody>
       </p:sp>
@@ -3745,7 +3716,7 @@
           <p:cNvPr id="12" name="TextBox 11">
             <a:extLst>
               <a:ext uri="{FF2B5EF4-FFF2-40B4-BE49-F238E27FC236}">
-                <a16:creationId xmlns:a16="http://schemas.microsoft.com/office/drawing/2014/main" xmlns="" id="{FD61DD69-C85E-46BF-9A25-9A06D53D0A79}"/>
+                <a16:creationId xmlns:a16="http://schemas.microsoft.com/office/drawing/2014/main" id="{FD61DD69-C85E-46BF-9A25-9A06D53D0A79}"/>
               </a:ext>
             </a:extLst>
           </p:cNvPr>
@@ -3754,8 +3725,8 @@
         </p:nvSpPr>
         <p:spPr>
           <a:xfrm>
-            <a:off x="28769733" y="11737895"/>
-            <a:ext cx="11049000" cy="5262979"/>
+            <a:off x="29796630" y="8851747"/>
+            <a:ext cx="11049000" cy="3631763"/>
           </a:xfrm>
           <a:prstGeom prst="rect">
             <a:avLst/>
@@ -3774,7 +3745,7 @@
           <a:lstStyle/>
           <a:p>
             <a:r>
-              <a:rPr lang="en-US" sz="7200" dirty="0"/>
+              <a:rPr lang="en-US" sz="5000" dirty="0"/>
               <a:t>Data Collection</a:t>
             </a:r>
           </a:p>
@@ -3784,7 +3755,7 @@
               <a:buChar char="•"/>
             </a:pPr>
             <a:r>
-              <a:rPr lang="en-US" sz="4400" dirty="0"/>
+              <a:rPr lang="en-US" sz="3000" dirty="0"/>
               <a:t>Qualitative Data collected via a survey on student opinion and usage of Worked Examples</a:t>
             </a:r>
           </a:p>
@@ -3794,16 +3765,26 @@
               <a:buChar char="•"/>
             </a:pPr>
             <a:r>
-              <a:rPr lang="en-US" sz="4400" dirty="0"/>
+              <a:rPr lang="en-US" sz="3000" dirty="0"/>
               <a:t>Quantitative Data collected via exercise completion rates and student interaction with </a:t>
             </a:r>
             <a:r>
-              <a:rPr lang="en-US" sz="4400" dirty="0" err="1"/>
+              <a:rPr lang="en-US" sz="3000" dirty="0" err="1"/>
               <a:t>Blockpy</a:t>
             </a:r>
             <a:r>
-              <a:rPr lang="en-US" sz="4400" dirty="0"/>
+              <a:rPr lang="en-US" sz="3000" dirty="0"/>
               <a:t> and Worked Example </a:t>
+            </a:r>
+          </a:p>
+          <a:p>
+            <a:pPr marL="1028700" lvl="1" indent="-571500">
+              <a:buFont typeface="Arial" panose="020B0604020202020204" pitchFamily="34" charset="0"/>
+              <a:buChar char="•"/>
+            </a:pPr>
+            <a:r>
+              <a:rPr lang="en-US" sz="3000" dirty="0"/>
+              <a:t>Worked Examples page was instrumented to log student interaction</a:t>
             </a:r>
           </a:p>
         </p:txBody>
@@ -3813,7 +3794,7 @@
           <p:cNvPr id="13" name="TextBox 12">
             <a:extLst>
               <a:ext uri="{FF2B5EF4-FFF2-40B4-BE49-F238E27FC236}">
-                <a16:creationId xmlns:a16="http://schemas.microsoft.com/office/drawing/2014/main" xmlns="" id="{3BDAEEC1-C345-4C79-A62B-FADFBFC0455A}"/>
+                <a16:creationId xmlns:a16="http://schemas.microsoft.com/office/drawing/2014/main" id="{3BDAEEC1-C345-4C79-A62B-FADFBFC0455A}"/>
               </a:ext>
             </a:extLst>
           </p:cNvPr>
@@ -3822,8 +3803,8 @@
         </p:nvSpPr>
         <p:spPr>
           <a:xfrm>
-            <a:off x="14673527" y="13148451"/>
-            <a:ext cx="11049000" cy="5262979"/>
+            <a:off x="17269775" y="8851203"/>
+            <a:ext cx="11944880" cy="3970318"/>
           </a:xfrm>
           <a:prstGeom prst="rect">
             <a:avLst/>
@@ -3842,8 +3823,12 @@
           <a:lstStyle/>
           <a:p>
             <a:r>
+              <a:rPr lang="en-US" sz="5000" dirty="0"/>
+              <a:t>Methodology</a:t>
+            </a:r>
+            <a:r>
               <a:rPr lang="en-US" sz="7200" dirty="0"/>
-              <a:t>Methodology </a:t>
+              <a:t> </a:t>
             </a:r>
           </a:p>
           <a:p>
@@ -3852,8 +3837,8 @@
               <a:buChar char="•"/>
             </a:pPr>
             <a:r>
-              <a:rPr lang="en-US" sz="4400" dirty="0"/>
-              <a:t>Used Fall 2017 section as baseline without Worked Examples </a:t>
+              <a:rPr lang="en-US" sz="3000" dirty="0"/>
+              <a:t>Manual inspection of prior student was used to determine “hard” problems</a:t>
             </a:r>
           </a:p>
           <a:p>
@@ -3862,8 +3847,8 @@
               <a:buChar char="•"/>
             </a:pPr>
             <a:r>
-              <a:rPr lang="en-US" sz="4400" dirty="0"/>
-              <a:t>Determine which programming exercises were “hard” for F17 students</a:t>
+              <a:rPr lang="en-US" sz="3000" dirty="0"/>
+              <a:t>“Hard” problems were those that took most students more than 20 edits to complete</a:t>
             </a:r>
           </a:p>
           <a:p>
@@ -3872,8 +3857,8 @@
               <a:buChar char="•"/>
             </a:pPr>
             <a:r>
-              <a:rPr lang="en-US" sz="4400" dirty="0"/>
-              <a:t>Create Worked Example related to “hard” problems for S18 section</a:t>
+              <a:rPr lang="en-US" sz="3000" dirty="0"/>
+              <a:t>Worked examples were developed for “hard” problems to help students </a:t>
             </a:r>
           </a:p>
         </p:txBody>
@@ -3883,7 +3868,7 @@
           <p:cNvPr id="14" name="TextBox 13">
             <a:extLst>
               <a:ext uri="{FF2B5EF4-FFF2-40B4-BE49-F238E27FC236}">
-                <a16:creationId xmlns:a16="http://schemas.microsoft.com/office/drawing/2014/main" xmlns="" id="{B95E43A4-FF9A-45CE-8FA8-5E0B1BE41117}"/>
+                <a16:creationId xmlns:a16="http://schemas.microsoft.com/office/drawing/2014/main" id="{B95E43A4-FF9A-45CE-8FA8-5E0B1BE41117}"/>
               </a:ext>
             </a:extLst>
           </p:cNvPr>
@@ -3912,12 +3897,19 @@
           <a:lstStyle/>
           <a:p>
             <a:r>
+              <a:rPr lang="en-US" sz="5000" dirty="0"/>
+              <a:t>References</a:t>
+            </a:r>
+            <a:r>
               <a:rPr lang="en-US" sz="7200" dirty="0"/>
-              <a:t>References </a:t>
-            </a:r>
-          </a:p>
-          <a:p>
-            <a:endParaRPr lang="en-US" sz="6600" dirty="0"/>
+              <a:t> </a:t>
+            </a:r>
+          </a:p>
+          <a:p>
+            <a:r>
+              <a:rPr lang="en-US" sz="6600" dirty="0"/>
+              <a:t>TODO</a:t>
+            </a:r>
           </a:p>
         </p:txBody>
       </p:sp>
@@ -3926,7 +3918,7 @@
           <p:cNvPr id="15" name="TextBox 14">
             <a:extLst>
               <a:ext uri="{FF2B5EF4-FFF2-40B4-BE49-F238E27FC236}">
-                <a16:creationId xmlns:a16="http://schemas.microsoft.com/office/drawing/2014/main" xmlns="" id="{474D9FEF-145C-4507-BA19-613301017388}"/>
+                <a16:creationId xmlns:a16="http://schemas.microsoft.com/office/drawing/2014/main" id="{474D9FEF-145C-4507-BA19-613301017388}"/>
               </a:ext>
             </a:extLst>
           </p:cNvPr>
@@ -3935,8 +3927,8 @@
         </p:nvSpPr>
         <p:spPr>
           <a:xfrm>
-            <a:off x="18233122" y="20604898"/>
-            <a:ext cx="10018186" cy="11172289"/>
+            <a:off x="30082063" y="21046137"/>
+            <a:ext cx="10018186" cy="8094524"/>
           </a:xfrm>
           <a:prstGeom prst="rect">
             <a:avLst/>
@@ -3955,25 +3947,31 @@
           <a:lstStyle/>
           <a:p>
             <a:r>
-              <a:rPr lang="en-US" sz="7200" dirty="0"/>
+              <a:rPr lang="en-US" sz="5000" dirty="0"/>
               <a:t>Conclusions</a:t>
             </a:r>
           </a:p>
           <a:p>
             <a:r>
-              <a:rPr lang="en-US" sz="4800" dirty="0"/>
+              <a:rPr lang="en-US" sz="3000" dirty="0"/>
               <a:t>	The Worked Example strategy we used seem to have little effect on the completion rate of hard problems. However, many students used them and found them helpful.</a:t>
             </a:r>
           </a:p>
           <a:p>
             <a:r>
-              <a:rPr lang="en-US" sz="4800" dirty="0"/>
-              <a:t>	Methods of selection “hard’ problems may have been flawed. All problems had high completion rates </a:t>
-            </a:r>
-          </a:p>
-          <a:p>
-            <a:r>
-              <a:rPr lang="en-US" sz="7200" dirty="0"/>
+              <a:rPr lang="en-US" sz="3000" dirty="0"/>
+              <a:t>	Methods of selection “hard’ problems may have been flawed. All problems had high completion rates (80-90%) before introducing WEs.</a:t>
+            </a:r>
+          </a:p>
+          <a:p>
+            <a:r>
+              <a:rPr lang="en-US" sz="3000" dirty="0"/>
+              <a:t>	The correlation between WE use and increased number of runs may suggest our implementation had no quantitative benefit. It may also simply show that students are more likely to use the WE if they have been working on the problem for longer. More analysis of event log is required to support this.</a:t>
+            </a:r>
+          </a:p>
+          <a:p>
+            <a:r>
+              <a:rPr lang="en-US" sz="5000" dirty="0"/>
               <a:t>Future work</a:t>
             </a:r>
           </a:p>
@@ -3983,8 +3981,8 @@
               <a:buChar char="•"/>
             </a:pPr>
             <a:r>
-              <a:rPr lang="en-US" sz="4800" dirty="0"/>
-              <a:t>	Interactive Worked Examples </a:t>
+              <a:rPr lang="en-US" sz="3000" dirty="0"/>
+              <a:t>Interactive Worked Examples </a:t>
             </a:r>
           </a:p>
           <a:p>
@@ -3993,11 +3991,11 @@
               <a:buChar char="•"/>
             </a:pPr>
             <a:r>
-              <a:rPr lang="en-US" sz="4800" dirty="0" err="1"/>
+              <a:rPr lang="en-US" sz="3000" dirty="0" err="1"/>
               <a:t>Subgoal</a:t>
             </a:r>
             <a:r>
-              <a:rPr lang="en-US" sz="4800" dirty="0"/>
+              <a:rPr lang="en-US" sz="3000" dirty="0"/>
               <a:t> only Worked Examples </a:t>
             </a:r>
           </a:p>
@@ -4007,7 +4005,7 @@
               <a:buChar char="•"/>
             </a:pPr>
             <a:r>
-              <a:rPr lang="en-US" sz="4800" dirty="0"/>
+              <a:rPr lang="en-US" sz="3000" dirty="0"/>
               <a:t>Alternative supplements material in large intro classes</a:t>
             </a:r>
           </a:p>
@@ -4018,7 +4016,7 @@
           <p:cNvPr id="16" name="TextBox 15">
             <a:extLst>
               <a:ext uri="{FF2B5EF4-FFF2-40B4-BE49-F238E27FC236}">
-                <a16:creationId xmlns:a16="http://schemas.microsoft.com/office/drawing/2014/main" xmlns="" id="{487B536B-0C75-4D18-A6DA-07CEF9C4A1D1}"/>
+                <a16:creationId xmlns:a16="http://schemas.microsoft.com/office/drawing/2014/main" id="{487B536B-0C75-4D18-A6DA-07CEF9C4A1D1}"/>
               </a:ext>
             </a:extLst>
           </p:cNvPr>
@@ -4027,8 +4025,8 @@
         </p:nvSpPr>
         <p:spPr>
           <a:xfrm>
-            <a:off x="2145773" y="18522369"/>
-            <a:ext cx="11049000" cy="12834283"/>
+            <a:off x="670401" y="14492709"/>
+            <a:ext cx="11049000" cy="861774"/>
           </a:xfrm>
           <a:prstGeom prst="rect">
             <a:avLst/>
@@ -4047,68 +4045,8 @@
           <a:lstStyle/>
           <a:p>
             <a:r>
-              <a:rPr lang="en-US" sz="7200" dirty="0"/>
+              <a:rPr lang="en-US" sz="5000" dirty="0"/>
               <a:t>Results</a:t>
-            </a:r>
-          </a:p>
-          <a:p>
-            <a:pPr marL="857250" indent="-857250">
-              <a:buFont typeface="Arial" panose="020B0604020202020204" pitchFamily="34" charset="0"/>
-              <a:buChar char="•"/>
-            </a:pPr>
-            <a:r>
-              <a:rPr lang="en-US" sz="5400" dirty="0"/>
-              <a:t>The addition of Worked Examples provided little to no gain on completion of hard problems</a:t>
-            </a:r>
-          </a:p>
-          <a:p>
-            <a:r>
-              <a:rPr lang="en-US" sz="5400" dirty="0"/>
-              <a:t>		&lt;Picture of completion chart&gt;</a:t>
-            </a:r>
-          </a:p>
-          <a:p>
-            <a:pPr marL="685800" indent="-685800">
-              <a:buFont typeface="Arial" panose="020B0604020202020204" pitchFamily="34" charset="0"/>
-              <a:buChar char="•"/>
-            </a:pPr>
-            <a:r>
-              <a:rPr lang="en-US" sz="5400" dirty="0"/>
-              <a:t>Measured usage of WE varied widely by problem, with an average around 50</a:t>
-            </a:r>
-          </a:p>
-          <a:p>
-            <a:pPr lvl="1"/>
-            <a:r>
-              <a:rPr lang="en-US" sz="5400" dirty="0"/>
-              <a:t>	&lt;Picture of usage chart&gt;</a:t>
-            </a:r>
-          </a:p>
-          <a:p>
-            <a:pPr marL="1143000" lvl="1" indent="-685800">
-              <a:buFont typeface="Arial" panose="020B0604020202020204" pitchFamily="34" charset="0"/>
-              <a:buChar char="•"/>
-            </a:pPr>
-            <a:r>
-              <a:rPr lang="en-US" sz="5400" dirty="0"/>
-              <a:t>50% of students claimed to read the Worked example at least most of the time </a:t>
-            </a:r>
-          </a:p>
-          <a:p>
-            <a:pPr lvl="2"/>
-            <a:r>
-              <a:rPr lang="en-US" sz="5400" dirty="0"/>
-              <a:t>&lt;Survey read frequency&gt;</a:t>
-            </a:r>
-          </a:p>
-          <a:p>
-            <a:pPr marL="1600200" lvl="2" indent="-685800">
-              <a:buFont typeface="Arial" panose="020B0604020202020204" pitchFamily="34" charset="0"/>
-              <a:buChar char="•"/>
-            </a:pPr>
-            <a:r>
-              <a:rPr lang="en-US" sz="5400" dirty="0"/>
-              <a:t>57% of students found the Worked examples helpful</a:t>
             </a:r>
           </a:p>
         </p:txBody>
@@ -4118,7 +4056,7 @@
           <p:cNvPr id="2" name="Rectangle 1">
             <a:extLst>
               <a:ext uri="{FF2B5EF4-FFF2-40B4-BE49-F238E27FC236}">
-                <a16:creationId xmlns:a16="http://schemas.microsoft.com/office/drawing/2014/main" xmlns="" id="{462652C4-E01F-4D77-BA6A-2650430629D1}"/>
+                <a16:creationId xmlns:a16="http://schemas.microsoft.com/office/drawing/2014/main" id="{462652C4-E01F-4D77-BA6A-2650430629D1}"/>
               </a:ext>
             </a:extLst>
           </p:cNvPr>
@@ -4161,6 +4099,1141 @@
             <a:r>
               <a:rPr lang="en-US" sz="4800" dirty="0"/>
               <a:t>VT Logo</a:t>
+            </a:r>
+          </a:p>
+        </p:txBody>
+      </p:sp>
+      <p:graphicFrame>
+        <p:nvGraphicFramePr>
+          <p:cNvPr id="4" name="Table 3">
+            <a:extLst>
+              <a:ext uri="{FF2B5EF4-FFF2-40B4-BE49-F238E27FC236}">
+                <a16:creationId xmlns:a16="http://schemas.microsoft.com/office/drawing/2014/main" id="{BC4C8F16-D2F7-48DF-B8B6-6D48E2FD47DE}"/>
+              </a:ext>
+            </a:extLst>
+          </p:cNvPr>
+          <p:cNvGraphicFramePr>
+            <a:graphicFrameLocks noGrp="1"/>
+          </p:cNvGraphicFramePr>
+          <p:nvPr>
+            <p:extLst>
+              <p:ext uri="{D42A27DB-BD31-4B8C-83A1-F6EECF244321}">
+                <p14:modId xmlns:p14="http://schemas.microsoft.com/office/powerpoint/2010/main" val="26491422"/>
+              </p:ext>
+            </p:extLst>
+          </p:nvPr>
+        </p:nvGraphicFramePr>
+        <p:xfrm>
+          <a:off x="11527180" y="9808793"/>
+          <a:ext cx="5377045" cy="2702648"/>
+        </p:xfrm>
+        <a:graphic>
+          <a:graphicData uri="http://schemas.openxmlformats.org/drawingml/2006/table">
+            <a:tbl>
+              <a:tblPr firstRow="1" bandRow="1">
+                <a:tableStyleId>{5C22544A-7EE6-4342-B048-85BDC9FD1C3A}</a:tableStyleId>
+              </a:tblPr>
+              <a:tblGrid>
+                <a:gridCol w="803154">
+                  <a:extLst>
+                    <a:ext uri="{9D8B030D-6E8A-4147-A177-3AD203B41FA5}">
+                      <a16:colId xmlns:a16="http://schemas.microsoft.com/office/drawing/2014/main" val="1246494410"/>
+                    </a:ext>
+                  </a:extLst>
+                </a:gridCol>
+                <a:gridCol w="1837924">
+                  <a:extLst>
+                    <a:ext uri="{9D8B030D-6E8A-4147-A177-3AD203B41FA5}">
+                      <a16:colId xmlns:a16="http://schemas.microsoft.com/office/drawing/2014/main" val="3707486989"/>
+                    </a:ext>
+                  </a:extLst>
+                </a:gridCol>
+                <a:gridCol w="1932816">
+                  <a:extLst>
+                    <a:ext uri="{9D8B030D-6E8A-4147-A177-3AD203B41FA5}">
+                      <a16:colId xmlns:a16="http://schemas.microsoft.com/office/drawing/2014/main" val="2676852081"/>
+                    </a:ext>
+                  </a:extLst>
+                </a:gridCol>
+                <a:gridCol w="803151">
+                  <a:extLst>
+                    <a:ext uri="{9D8B030D-6E8A-4147-A177-3AD203B41FA5}">
+                      <a16:colId xmlns:a16="http://schemas.microsoft.com/office/drawing/2014/main" val="3454277832"/>
+                    </a:ext>
+                  </a:extLst>
+                </a:gridCol>
+              </a:tblGrid>
+              <a:tr h="755617">
+                <a:tc>
+                  <a:txBody>
+                    <a:bodyPr/>
+                    <a:lstStyle/>
+                    <a:p>
+                      <a:endParaRPr lang="en-US" sz="2400" dirty="0"/>
+                    </a:p>
+                  </a:txBody>
+                  <a:tcPr anchor="ctr">
+                    <a:solidFill>
+                      <a:srgbClr val="8E2344"/>
+                    </a:solidFill>
+                  </a:tcPr>
+                </a:tc>
+                <a:tc>
+                  <a:txBody>
+                    <a:bodyPr/>
+                    <a:lstStyle/>
+                    <a:p>
+                      <a:pPr algn="ctr"/>
+                      <a:r>
+                        <a:rPr lang="en-US" sz="2400" dirty="0"/>
+                        <a:t>Prior Experience</a:t>
+                      </a:r>
+                    </a:p>
+                  </a:txBody>
+                  <a:tcPr anchor="ctr">
+                    <a:solidFill>
+                      <a:srgbClr val="8E2344"/>
+                    </a:solidFill>
+                  </a:tcPr>
+                </a:tc>
+                <a:tc>
+                  <a:txBody>
+                    <a:bodyPr/>
+                    <a:lstStyle/>
+                    <a:p>
+                      <a:pPr algn="ctr"/>
+                      <a:r>
+                        <a:rPr lang="en-US" sz="2400" dirty="0"/>
+                        <a:t>No Prior Experience</a:t>
+                      </a:r>
+                    </a:p>
+                  </a:txBody>
+                  <a:tcPr anchor="ctr">
+                    <a:solidFill>
+                      <a:srgbClr val="8E2344"/>
+                    </a:solidFill>
+                  </a:tcPr>
+                </a:tc>
+                <a:tc>
+                  <a:txBody>
+                    <a:bodyPr/>
+                    <a:lstStyle/>
+                    <a:p>
+                      <a:pPr algn="ctr"/>
+                      <a:r>
+                        <a:rPr lang="en-US" sz="2400" dirty="0"/>
+                        <a:t>Total</a:t>
+                      </a:r>
+                    </a:p>
+                  </a:txBody>
+                  <a:tcPr anchor="ctr">
+                    <a:solidFill>
+                      <a:srgbClr val="8E2344"/>
+                    </a:solidFill>
+                  </a:tcPr>
+                </a:tc>
+                <a:extLst>
+                  <a:ext uri="{0D108BD9-81ED-4DB2-BD59-A6C34878D82A}">
+                    <a16:rowId xmlns:a16="http://schemas.microsoft.com/office/drawing/2014/main" val="2084501009"/>
+                  </a:ext>
+                </a:extLst>
+              </a:tr>
+              <a:tr h="638503">
+                <a:tc>
+                  <a:txBody>
+                    <a:bodyPr/>
+                    <a:lstStyle/>
+                    <a:p>
+                      <a:pPr algn="ctr"/>
+                      <a:r>
+                        <a:rPr lang="en-US" sz="2400" dirty="0">
+                          <a:solidFill>
+                            <a:schemeClr val="bg1"/>
+                          </a:solidFill>
+                        </a:rPr>
+                        <a:t>F17</a:t>
+                      </a:r>
+                    </a:p>
+                  </a:txBody>
+                  <a:tcPr anchor="ctr">
+                    <a:solidFill>
+                      <a:srgbClr val="8E2344"/>
+                    </a:solidFill>
+                  </a:tcPr>
+                </a:tc>
+                <a:tc>
+                  <a:txBody>
+                    <a:bodyPr/>
+                    <a:lstStyle/>
+                    <a:p>
+                      <a:pPr algn="ctr"/>
+                      <a:r>
+                        <a:rPr lang="en-US" sz="3000" dirty="0"/>
+                        <a:t>240</a:t>
+                      </a:r>
+                    </a:p>
+                  </a:txBody>
+                  <a:tcPr anchor="ctr"/>
+                </a:tc>
+                <a:tc>
+                  <a:txBody>
+                    <a:bodyPr/>
+                    <a:lstStyle/>
+                    <a:p>
+                      <a:pPr algn="ctr"/>
+                      <a:r>
+                        <a:rPr lang="en-US" sz="3000" dirty="0"/>
+                        <a:t>41</a:t>
+                      </a:r>
+                    </a:p>
+                  </a:txBody>
+                  <a:tcPr anchor="ctr"/>
+                </a:tc>
+                <a:tc>
+                  <a:txBody>
+                    <a:bodyPr/>
+                    <a:lstStyle/>
+                    <a:p>
+                      <a:pPr algn="ctr"/>
+                      <a:r>
+                        <a:rPr lang="en-US" sz="3000" dirty="0"/>
+                        <a:t>281</a:t>
+                      </a:r>
+                    </a:p>
+                  </a:txBody>
+                  <a:tcPr anchor="ctr"/>
+                </a:tc>
+                <a:extLst>
+                  <a:ext uri="{0D108BD9-81ED-4DB2-BD59-A6C34878D82A}">
+                    <a16:rowId xmlns:a16="http://schemas.microsoft.com/office/drawing/2014/main" val="2612314924"/>
+                  </a:ext>
+                </a:extLst>
+              </a:tr>
+              <a:tr h="638503">
+                <a:tc>
+                  <a:txBody>
+                    <a:bodyPr/>
+                    <a:lstStyle/>
+                    <a:p>
+                      <a:pPr algn="ctr"/>
+                      <a:r>
+                        <a:rPr lang="en-US" sz="2400" dirty="0">
+                          <a:solidFill>
+                            <a:schemeClr val="bg1"/>
+                          </a:solidFill>
+                        </a:rPr>
+                        <a:t>S18</a:t>
+                      </a:r>
+                    </a:p>
+                  </a:txBody>
+                  <a:tcPr anchor="ctr">
+                    <a:solidFill>
+                      <a:srgbClr val="8E2344"/>
+                    </a:solidFill>
+                  </a:tcPr>
+                </a:tc>
+                <a:tc>
+                  <a:txBody>
+                    <a:bodyPr/>
+                    <a:lstStyle/>
+                    <a:p>
+                      <a:pPr algn="ctr"/>
+                      <a:r>
+                        <a:rPr lang="en-US" sz="3000" dirty="0"/>
+                        <a:t>197</a:t>
+                      </a:r>
+                    </a:p>
+                  </a:txBody>
+                  <a:tcPr anchor="ctr"/>
+                </a:tc>
+                <a:tc>
+                  <a:txBody>
+                    <a:bodyPr/>
+                    <a:lstStyle/>
+                    <a:p>
+                      <a:pPr algn="ctr"/>
+                      <a:r>
+                        <a:rPr lang="en-US" sz="3000" dirty="0"/>
+                        <a:t>43</a:t>
+                      </a:r>
+                    </a:p>
+                  </a:txBody>
+                  <a:tcPr anchor="ctr"/>
+                </a:tc>
+                <a:tc>
+                  <a:txBody>
+                    <a:bodyPr/>
+                    <a:lstStyle/>
+                    <a:p>
+                      <a:pPr algn="ctr"/>
+                      <a:r>
+                        <a:rPr lang="en-US" sz="3000" dirty="0"/>
+                        <a:t>240</a:t>
+                      </a:r>
+                    </a:p>
+                  </a:txBody>
+                  <a:tcPr anchor="ctr"/>
+                </a:tc>
+                <a:extLst>
+                  <a:ext uri="{0D108BD9-81ED-4DB2-BD59-A6C34878D82A}">
+                    <a16:rowId xmlns:a16="http://schemas.microsoft.com/office/drawing/2014/main" val="685837746"/>
+                  </a:ext>
+                </a:extLst>
+              </a:tr>
+              <a:tr h="602682">
+                <a:tc>
+                  <a:txBody>
+                    <a:bodyPr/>
+                    <a:lstStyle/>
+                    <a:p>
+                      <a:pPr algn="ctr"/>
+                      <a:r>
+                        <a:rPr lang="en-US" sz="2400" dirty="0">
+                          <a:solidFill>
+                            <a:schemeClr val="bg1"/>
+                          </a:solidFill>
+                        </a:rPr>
+                        <a:t>Total</a:t>
+                      </a:r>
+                    </a:p>
+                  </a:txBody>
+                  <a:tcPr anchor="ctr">
+                    <a:solidFill>
+                      <a:srgbClr val="8E2344"/>
+                    </a:solidFill>
+                  </a:tcPr>
+                </a:tc>
+                <a:tc>
+                  <a:txBody>
+                    <a:bodyPr/>
+                    <a:lstStyle/>
+                    <a:p>
+                      <a:pPr algn="ctr"/>
+                      <a:r>
+                        <a:rPr lang="en-US" sz="3000" dirty="0"/>
+                        <a:t>437</a:t>
+                      </a:r>
+                    </a:p>
+                  </a:txBody>
+                  <a:tcPr anchor="ctr"/>
+                </a:tc>
+                <a:tc>
+                  <a:txBody>
+                    <a:bodyPr/>
+                    <a:lstStyle/>
+                    <a:p>
+                      <a:pPr algn="ctr"/>
+                      <a:r>
+                        <a:rPr lang="en-US" sz="3000" dirty="0"/>
+                        <a:t>84</a:t>
+                      </a:r>
+                    </a:p>
+                  </a:txBody>
+                  <a:tcPr anchor="ctr"/>
+                </a:tc>
+                <a:tc>
+                  <a:txBody>
+                    <a:bodyPr/>
+                    <a:lstStyle/>
+                    <a:p>
+                      <a:endParaRPr lang="en-US" sz="3000" dirty="0"/>
+                    </a:p>
+                  </a:txBody>
+                  <a:tcPr anchor="ctr"/>
+                </a:tc>
+                <a:extLst>
+                  <a:ext uri="{0D108BD9-81ED-4DB2-BD59-A6C34878D82A}">
+                    <a16:rowId xmlns:a16="http://schemas.microsoft.com/office/drawing/2014/main" val="2484121680"/>
+                  </a:ext>
+                </a:extLst>
+              </a:tr>
+            </a:tbl>
+          </a:graphicData>
+        </a:graphic>
+      </p:graphicFrame>
+      <p:graphicFrame>
+        <p:nvGraphicFramePr>
+          <p:cNvPr id="19" name="Object 18">
+            <a:extLst>
+              <a:ext uri="{FF2B5EF4-FFF2-40B4-BE49-F238E27FC236}">
+                <a16:creationId xmlns:a16="http://schemas.microsoft.com/office/drawing/2014/main" id="{EE881DD3-55CC-439E-9E25-F44AD8AFB32E}"/>
+              </a:ext>
+            </a:extLst>
+          </p:cNvPr>
+          <p:cNvGraphicFramePr>
+            <a:graphicFrameLocks noChangeAspect="1"/>
+          </p:cNvGraphicFramePr>
+          <p:nvPr>
+            <p:extLst>
+              <p:ext uri="{D42A27DB-BD31-4B8C-83A1-F6EECF244321}">
+                <p14:modId xmlns:p14="http://schemas.microsoft.com/office/powerpoint/2010/main" val="3333703710"/>
+              </p:ext>
+            </p:extLst>
+          </p:nvPr>
+        </p:nvGraphicFramePr>
+        <p:xfrm>
+          <a:off x="7315200" y="6705600"/>
+          <a:ext cx="29260800" cy="19507200"/>
+        </p:xfrm>
+        <a:graphic>
+          <a:graphicData uri="http://schemas.openxmlformats.org/presentationml/2006/ole">
+            <mc:AlternateContent xmlns:mc="http://schemas.openxmlformats.org/markup-compatibility/2006">
+              <mc:Choice xmlns:v="urn:schemas-microsoft-com:vml" Requires="v">
+                <p:oleObj spid="_x0000_s1046" name="FDF" r:id="rId3" imgW="0" imgH="0" progId="FoxitReader.FDFDoc">
+                  <p:embed/>
+                </p:oleObj>
+              </mc:Choice>
+              <mc:Fallback>
+                <p:oleObj name="FDF" r:id="rId3" imgW="0" imgH="0" progId="FoxitReader.FDFDoc">
+                  <p:embed/>
+                  <p:pic>
+                    <p:nvPicPr>
+                      <p:cNvPr id="0" name=""/>
+                      <p:cNvPicPr/>
+                      <p:nvPr/>
+                    </p:nvPicPr>
+                    <p:blipFill/>
+                    <p:spPr>
+                      <a:xfrm>
+                        <a:off x="7315200" y="6705600"/>
+                        <a:ext cx="29260800" cy="19507200"/>
+                      </a:xfrm>
+                      <a:prstGeom prst="rect">
+                        <a:avLst/>
+                      </a:prstGeom>
+                    </p:spPr>
+                  </p:pic>
+                </p:oleObj>
+              </mc:Fallback>
+            </mc:AlternateContent>
+          </a:graphicData>
+        </a:graphic>
+      </p:graphicFrame>
+      <p:pic>
+        <p:nvPicPr>
+          <p:cNvPr id="22" name="Picture 21">
+            <a:extLst>
+              <a:ext uri="{FF2B5EF4-FFF2-40B4-BE49-F238E27FC236}">
+                <a16:creationId xmlns:a16="http://schemas.microsoft.com/office/drawing/2014/main" id="{9A959213-3A41-4840-BFC2-AE43D8E90DA2}"/>
+              </a:ext>
+            </a:extLst>
+          </p:cNvPr>
+          <p:cNvPicPr>
+            <a:picLocks noChangeAspect="1"/>
+          </p:cNvPicPr>
+          <p:nvPr/>
+        </p:nvPicPr>
+        <p:blipFill>
+          <a:blip r:embed="rId4">
+            <a:extLst>
+              <a:ext uri="{28A0092B-C50C-407E-A947-70E740481C1C}">
+                <a14:useLocalDpi xmlns:a14="http://schemas.microsoft.com/office/drawing/2010/main" val="0"/>
+              </a:ext>
+            </a:extLst>
+          </a:blip>
+          <a:stretch>
+            <a:fillRect/>
+          </a:stretch>
+        </p:blipFill>
+        <p:spPr>
+          <a:xfrm>
+            <a:off x="22586971" y="13782611"/>
+            <a:ext cx="7209659" cy="5324535"/>
+          </a:xfrm>
+          <a:prstGeom prst="rect">
+            <a:avLst/>
+          </a:prstGeom>
+        </p:spPr>
+      </p:pic>
+      <p:pic>
+        <p:nvPicPr>
+          <p:cNvPr id="24" name="Picture 23">
+            <a:extLst>
+              <a:ext uri="{FF2B5EF4-FFF2-40B4-BE49-F238E27FC236}">
+                <a16:creationId xmlns:a16="http://schemas.microsoft.com/office/drawing/2014/main" id="{F1216618-CF59-42BE-BE4B-DA00E879F3EB}"/>
+              </a:ext>
+            </a:extLst>
+          </p:cNvPr>
+          <p:cNvPicPr>
+            <a:picLocks noChangeAspect="1"/>
+          </p:cNvPicPr>
+          <p:nvPr/>
+        </p:nvPicPr>
+        <p:blipFill>
+          <a:blip r:embed="rId5">
+            <a:extLst>
+              <a:ext uri="{28A0092B-C50C-407E-A947-70E740481C1C}">
+                <a14:useLocalDpi xmlns:a14="http://schemas.microsoft.com/office/drawing/2010/main" val="0"/>
+              </a:ext>
+            </a:extLst>
+          </a:blip>
+          <a:stretch>
+            <a:fillRect/>
+          </a:stretch>
+        </p:blipFill>
+        <p:spPr>
+          <a:xfrm>
+            <a:off x="29908650" y="13931851"/>
+            <a:ext cx="8894032" cy="5026054"/>
+          </a:xfrm>
+          <a:prstGeom prst="rect">
+            <a:avLst/>
+          </a:prstGeom>
+        </p:spPr>
+      </p:pic>
+      <p:pic>
+        <p:nvPicPr>
+          <p:cNvPr id="27" name="Picture 26">
+            <a:extLst>
+              <a:ext uri="{FF2B5EF4-FFF2-40B4-BE49-F238E27FC236}">
+                <a16:creationId xmlns:a16="http://schemas.microsoft.com/office/drawing/2014/main" id="{97C19C54-47A4-4384-AE5D-0A0D2F87A8F6}"/>
+              </a:ext>
+            </a:extLst>
+          </p:cNvPr>
+          <p:cNvPicPr>
+            <a:picLocks noChangeAspect="1"/>
+          </p:cNvPicPr>
+          <p:nvPr/>
+        </p:nvPicPr>
+        <p:blipFill>
+          <a:blip r:embed="rId6">
+            <a:extLst>
+              <a:ext uri="{28A0092B-C50C-407E-A947-70E740481C1C}">
+                <a14:useLocalDpi xmlns:a14="http://schemas.microsoft.com/office/drawing/2010/main" val="0"/>
+              </a:ext>
+            </a:extLst>
+          </a:blip>
+          <a:stretch>
+            <a:fillRect/>
+          </a:stretch>
+        </p:blipFill>
+        <p:spPr>
+          <a:xfrm>
+            <a:off x="653419" y="21381199"/>
+            <a:ext cx="6845369" cy="3720009"/>
+          </a:xfrm>
+          <a:prstGeom prst="rect">
+            <a:avLst/>
+          </a:prstGeom>
+        </p:spPr>
+      </p:pic>
+      <p:sp>
+        <p:nvSpPr>
+          <p:cNvPr id="28" name="TextBox 27">
+            <a:extLst>
+              <a:ext uri="{FF2B5EF4-FFF2-40B4-BE49-F238E27FC236}">
+                <a16:creationId xmlns:a16="http://schemas.microsoft.com/office/drawing/2014/main" id="{7C418816-CE3A-4CBA-8B98-E6674AC875B1}"/>
+              </a:ext>
+            </a:extLst>
+          </p:cNvPr>
+          <p:cNvSpPr txBox="1"/>
+          <p:nvPr/>
+        </p:nvSpPr>
+        <p:spPr>
+          <a:xfrm>
+            <a:off x="1117496" y="20771402"/>
+            <a:ext cx="5905500" cy="646331"/>
+          </a:xfrm>
+          <a:prstGeom prst="rect">
+            <a:avLst/>
+          </a:prstGeom>
+          <a:noFill/>
+        </p:spPr>
+        <p:txBody>
+          <a:bodyPr wrap="square" rtlCol="0">
+            <a:spAutoFit/>
+          </a:bodyPr>
+          <a:lstStyle/>
+          <a:p>
+            <a:pPr algn="ctr"/>
+            <a:r>
+              <a:rPr lang="en-US" dirty="0"/>
+              <a:t>The addition of Worked Examples provided little to no gain on completion of hard problems</a:t>
+            </a:r>
+          </a:p>
+        </p:txBody>
+      </p:sp>
+      <p:pic>
+        <p:nvPicPr>
+          <p:cNvPr id="30" name="Picture 29">
+            <a:extLst>
+              <a:ext uri="{FF2B5EF4-FFF2-40B4-BE49-F238E27FC236}">
+                <a16:creationId xmlns:a16="http://schemas.microsoft.com/office/drawing/2014/main" id="{6F1AED26-7926-43E7-B15C-0BBD1420A894}"/>
+              </a:ext>
+            </a:extLst>
+          </p:cNvPr>
+          <p:cNvPicPr>
+            <a:picLocks noChangeAspect="1"/>
+          </p:cNvPicPr>
+          <p:nvPr/>
+        </p:nvPicPr>
+        <p:blipFill>
+          <a:blip r:embed="rId7">
+            <a:extLst>
+              <a:ext uri="{28A0092B-C50C-407E-A947-70E740481C1C}">
+                <a14:useLocalDpi xmlns:a14="http://schemas.microsoft.com/office/drawing/2010/main" val="0"/>
+              </a:ext>
+            </a:extLst>
+          </a:blip>
+          <a:stretch>
+            <a:fillRect/>
+          </a:stretch>
+        </p:blipFill>
+        <p:spPr>
+          <a:xfrm>
+            <a:off x="8073532" y="21226952"/>
+            <a:ext cx="3375054" cy="3949927"/>
+          </a:xfrm>
+          <a:prstGeom prst="rect">
+            <a:avLst/>
+          </a:prstGeom>
+        </p:spPr>
+      </p:pic>
+      <p:sp>
+        <p:nvSpPr>
+          <p:cNvPr id="31" name="TextBox 30">
+            <a:extLst>
+              <a:ext uri="{FF2B5EF4-FFF2-40B4-BE49-F238E27FC236}">
+                <a16:creationId xmlns:a16="http://schemas.microsoft.com/office/drawing/2014/main" id="{398CCCF6-E198-4B1C-B101-09E2ED674350}"/>
+              </a:ext>
+            </a:extLst>
+          </p:cNvPr>
+          <p:cNvSpPr txBox="1"/>
+          <p:nvPr/>
+        </p:nvSpPr>
+        <p:spPr>
+          <a:xfrm>
+            <a:off x="7952099" y="20457869"/>
+            <a:ext cx="3490610" cy="923330"/>
+          </a:xfrm>
+          <a:prstGeom prst="rect">
+            <a:avLst/>
+          </a:prstGeom>
+          <a:noFill/>
+        </p:spPr>
+        <p:txBody>
+          <a:bodyPr wrap="square" rtlCol="0">
+            <a:spAutoFit/>
+          </a:bodyPr>
+          <a:lstStyle/>
+          <a:p>
+            <a:pPr algn="ctr"/>
+            <a:r>
+              <a:rPr lang="en-US" dirty="0"/>
+              <a:t>Measured usage of WE varied widely by problem, with an average around 50</a:t>
+            </a:r>
+          </a:p>
+        </p:txBody>
+      </p:sp>
+      <p:graphicFrame>
+        <p:nvGraphicFramePr>
+          <p:cNvPr id="33" name="Table 32">
+            <a:extLst>
+              <a:ext uri="{FF2B5EF4-FFF2-40B4-BE49-F238E27FC236}">
+                <a16:creationId xmlns:a16="http://schemas.microsoft.com/office/drawing/2014/main" id="{994531D4-9CD1-44D7-9A25-AB676A34C0B9}"/>
+              </a:ext>
+            </a:extLst>
+          </p:cNvPr>
+          <p:cNvGraphicFramePr>
+            <a:graphicFrameLocks noGrp="1"/>
+          </p:cNvGraphicFramePr>
+          <p:nvPr>
+            <p:extLst>
+              <p:ext uri="{D42A27DB-BD31-4B8C-83A1-F6EECF244321}">
+                <p14:modId xmlns:p14="http://schemas.microsoft.com/office/powerpoint/2010/main" val="1679397783"/>
+              </p:ext>
+            </p:extLst>
+          </p:nvPr>
+        </p:nvGraphicFramePr>
+        <p:xfrm>
+          <a:off x="1466850" y="16528619"/>
+          <a:ext cx="6155622" cy="3152625"/>
+        </p:xfrm>
+        <a:graphic>
+          <a:graphicData uri="http://schemas.openxmlformats.org/drawingml/2006/table">
+            <a:tbl>
+              <a:tblPr firstRow="1" bandRow="1">
+                <a:tableStyleId>{5C22544A-7EE6-4342-B048-85BDC9FD1C3A}</a:tableStyleId>
+              </a:tblPr>
+              <a:tblGrid>
+                <a:gridCol w="1224100">
+                  <a:extLst>
+                    <a:ext uri="{9D8B030D-6E8A-4147-A177-3AD203B41FA5}">
+                      <a16:colId xmlns:a16="http://schemas.microsoft.com/office/drawing/2014/main" val="1246494410"/>
+                    </a:ext>
+                  </a:extLst>
+                </a:gridCol>
+                <a:gridCol w="1799396">
+                  <a:extLst>
+                    <a:ext uri="{9D8B030D-6E8A-4147-A177-3AD203B41FA5}">
+                      <a16:colId xmlns:a16="http://schemas.microsoft.com/office/drawing/2014/main" val="3707486989"/>
+                    </a:ext>
+                  </a:extLst>
+                </a:gridCol>
+                <a:gridCol w="2212681">
+                  <a:extLst>
+                    <a:ext uri="{9D8B030D-6E8A-4147-A177-3AD203B41FA5}">
+                      <a16:colId xmlns:a16="http://schemas.microsoft.com/office/drawing/2014/main" val="2676852081"/>
+                    </a:ext>
+                  </a:extLst>
+                </a:gridCol>
+                <a:gridCol w="919445">
+                  <a:extLst>
+                    <a:ext uri="{9D8B030D-6E8A-4147-A177-3AD203B41FA5}">
+                      <a16:colId xmlns:a16="http://schemas.microsoft.com/office/drawing/2014/main" val="3454277832"/>
+                    </a:ext>
+                  </a:extLst>
+                </a:gridCol>
+              </a:tblGrid>
+              <a:tr h="904023">
+                <a:tc>
+                  <a:txBody>
+                    <a:bodyPr/>
+                    <a:lstStyle/>
+                    <a:p>
+                      <a:endParaRPr lang="en-US" sz="2400" dirty="0"/>
+                    </a:p>
+                  </a:txBody>
+                  <a:tcPr anchor="ctr">
+                    <a:solidFill>
+                      <a:srgbClr val="8E2344"/>
+                    </a:solidFill>
+                  </a:tcPr>
+                </a:tc>
+                <a:tc>
+                  <a:txBody>
+                    <a:bodyPr/>
+                    <a:lstStyle/>
+                    <a:p>
+                      <a:pPr algn="ctr"/>
+                      <a:r>
+                        <a:rPr lang="en-US" sz="2400" dirty="0"/>
+                        <a:t>Prior Experience</a:t>
+                      </a:r>
+                    </a:p>
+                  </a:txBody>
+                  <a:tcPr anchor="ctr">
+                    <a:solidFill>
+                      <a:srgbClr val="8E2344"/>
+                    </a:solidFill>
+                  </a:tcPr>
+                </a:tc>
+                <a:tc>
+                  <a:txBody>
+                    <a:bodyPr/>
+                    <a:lstStyle/>
+                    <a:p>
+                      <a:pPr algn="ctr"/>
+                      <a:r>
+                        <a:rPr lang="en-US" sz="2400" dirty="0"/>
+                        <a:t>No Prior Experience</a:t>
+                      </a:r>
+                    </a:p>
+                  </a:txBody>
+                  <a:tcPr anchor="ctr">
+                    <a:solidFill>
+                      <a:srgbClr val="8E2344"/>
+                    </a:solidFill>
+                  </a:tcPr>
+                </a:tc>
+                <a:tc>
+                  <a:txBody>
+                    <a:bodyPr/>
+                    <a:lstStyle/>
+                    <a:p>
+                      <a:pPr algn="ctr"/>
+                      <a:r>
+                        <a:rPr lang="en-US" sz="2400" dirty="0"/>
+                        <a:t>Total</a:t>
+                      </a:r>
+                    </a:p>
+                  </a:txBody>
+                  <a:tcPr anchor="ctr">
+                    <a:solidFill>
+                      <a:srgbClr val="8E2344"/>
+                    </a:solidFill>
+                  </a:tcPr>
+                </a:tc>
+                <a:extLst>
+                  <a:ext uri="{0D108BD9-81ED-4DB2-BD59-A6C34878D82A}">
+                    <a16:rowId xmlns:a16="http://schemas.microsoft.com/office/drawing/2014/main" val="2084501009"/>
+                  </a:ext>
+                </a:extLst>
+              </a:tr>
+              <a:tr h="638503">
+                <a:tc>
+                  <a:txBody>
+                    <a:bodyPr/>
+                    <a:lstStyle/>
+                    <a:p>
+                      <a:pPr algn="ctr"/>
+                      <a:r>
+                        <a:rPr lang="en-US" sz="2400" dirty="0">
+                          <a:solidFill>
+                            <a:schemeClr val="bg1"/>
+                          </a:solidFill>
+                        </a:rPr>
+                        <a:t>WE Helpful</a:t>
+                      </a:r>
+                    </a:p>
+                  </a:txBody>
+                  <a:tcPr anchor="ctr">
+                    <a:solidFill>
+                      <a:srgbClr val="8E2344"/>
+                    </a:solidFill>
+                  </a:tcPr>
+                </a:tc>
+                <a:tc>
+                  <a:txBody>
+                    <a:bodyPr/>
+                    <a:lstStyle/>
+                    <a:p>
+                      <a:pPr algn="ctr"/>
+                      <a:r>
+                        <a:rPr lang="en-US" sz="3000" dirty="0"/>
+                        <a:t>108</a:t>
+                      </a:r>
+                    </a:p>
+                  </a:txBody>
+                  <a:tcPr anchor="ctr"/>
+                </a:tc>
+                <a:tc>
+                  <a:txBody>
+                    <a:bodyPr/>
+                    <a:lstStyle/>
+                    <a:p>
+                      <a:pPr algn="ctr"/>
+                      <a:r>
+                        <a:rPr lang="en-US" sz="3000" dirty="0"/>
+                        <a:t>29</a:t>
+                      </a:r>
+                    </a:p>
+                  </a:txBody>
+                  <a:tcPr anchor="ctr"/>
+                </a:tc>
+                <a:tc>
+                  <a:txBody>
+                    <a:bodyPr/>
+                    <a:lstStyle/>
+                    <a:p>
+                      <a:pPr algn="ctr"/>
+                      <a:r>
+                        <a:rPr lang="en-US" sz="3000" dirty="0"/>
+                        <a:t>137</a:t>
+                      </a:r>
+                    </a:p>
+                  </a:txBody>
+                  <a:tcPr anchor="ctr"/>
+                </a:tc>
+                <a:extLst>
+                  <a:ext uri="{0D108BD9-81ED-4DB2-BD59-A6C34878D82A}">
+                    <a16:rowId xmlns:a16="http://schemas.microsoft.com/office/drawing/2014/main" val="2612314924"/>
+                  </a:ext>
+                </a:extLst>
+              </a:tr>
+              <a:tr h="638503">
+                <a:tc>
+                  <a:txBody>
+                    <a:bodyPr/>
+                    <a:lstStyle/>
+                    <a:p>
+                      <a:pPr algn="ctr"/>
+                      <a:r>
+                        <a:rPr lang="en-US" sz="2400" dirty="0">
+                          <a:solidFill>
+                            <a:schemeClr val="bg1"/>
+                          </a:solidFill>
+                        </a:rPr>
+                        <a:t>WE Not Helpful</a:t>
+                      </a:r>
+                    </a:p>
+                  </a:txBody>
+                  <a:tcPr anchor="ctr">
+                    <a:solidFill>
+                      <a:srgbClr val="8E2344"/>
+                    </a:solidFill>
+                  </a:tcPr>
+                </a:tc>
+                <a:tc>
+                  <a:txBody>
+                    <a:bodyPr/>
+                    <a:lstStyle/>
+                    <a:p>
+                      <a:pPr algn="ctr"/>
+                      <a:r>
+                        <a:rPr lang="en-US" sz="3000" dirty="0"/>
+                        <a:t>66</a:t>
+                      </a:r>
+                    </a:p>
+                  </a:txBody>
+                  <a:tcPr anchor="ctr"/>
+                </a:tc>
+                <a:tc>
+                  <a:txBody>
+                    <a:bodyPr/>
+                    <a:lstStyle/>
+                    <a:p>
+                      <a:pPr algn="ctr"/>
+                      <a:r>
+                        <a:rPr lang="en-US" sz="3000" dirty="0"/>
+                        <a:t>12</a:t>
+                      </a:r>
+                    </a:p>
+                  </a:txBody>
+                  <a:tcPr anchor="ctr"/>
+                </a:tc>
+                <a:tc>
+                  <a:txBody>
+                    <a:bodyPr/>
+                    <a:lstStyle/>
+                    <a:p>
+                      <a:pPr algn="ctr"/>
+                      <a:r>
+                        <a:rPr lang="en-US" sz="3000" dirty="0"/>
+                        <a:t>78</a:t>
+                      </a:r>
+                    </a:p>
+                  </a:txBody>
+                  <a:tcPr anchor="ctr"/>
+                </a:tc>
+                <a:extLst>
+                  <a:ext uri="{0D108BD9-81ED-4DB2-BD59-A6C34878D82A}">
+                    <a16:rowId xmlns:a16="http://schemas.microsoft.com/office/drawing/2014/main" val="685837746"/>
+                  </a:ext>
+                </a:extLst>
+              </a:tr>
+              <a:tr h="602682">
+                <a:tc>
+                  <a:txBody>
+                    <a:bodyPr/>
+                    <a:lstStyle/>
+                    <a:p>
+                      <a:pPr algn="ctr"/>
+                      <a:r>
+                        <a:rPr lang="en-US" sz="2400" dirty="0">
+                          <a:solidFill>
+                            <a:schemeClr val="bg1"/>
+                          </a:solidFill>
+                        </a:rPr>
+                        <a:t>Total</a:t>
+                      </a:r>
+                    </a:p>
+                  </a:txBody>
+                  <a:tcPr anchor="ctr">
+                    <a:solidFill>
+                      <a:srgbClr val="8E2344"/>
+                    </a:solidFill>
+                  </a:tcPr>
+                </a:tc>
+                <a:tc>
+                  <a:txBody>
+                    <a:bodyPr/>
+                    <a:lstStyle/>
+                    <a:p>
+                      <a:pPr algn="ctr"/>
+                      <a:r>
+                        <a:rPr lang="en-US" sz="3000" dirty="0"/>
+                        <a:t>174</a:t>
+                      </a:r>
+                    </a:p>
+                  </a:txBody>
+                  <a:tcPr anchor="ctr"/>
+                </a:tc>
+                <a:tc>
+                  <a:txBody>
+                    <a:bodyPr/>
+                    <a:lstStyle/>
+                    <a:p>
+                      <a:pPr algn="ctr"/>
+                      <a:r>
+                        <a:rPr lang="en-US" sz="3000" dirty="0"/>
+                        <a:t>41</a:t>
+                      </a:r>
+                    </a:p>
+                  </a:txBody>
+                  <a:tcPr anchor="ctr"/>
+                </a:tc>
+                <a:tc>
+                  <a:txBody>
+                    <a:bodyPr/>
+                    <a:lstStyle/>
+                    <a:p>
+                      <a:endParaRPr lang="en-US" sz="3000" dirty="0"/>
+                    </a:p>
+                  </a:txBody>
+                  <a:tcPr anchor="ctr"/>
+                </a:tc>
+                <a:extLst>
+                  <a:ext uri="{0D108BD9-81ED-4DB2-BD59-A6C34878D82A}">
+                    <a16:rowId xmlns:a16="http://schemas.microsoft.com/office/drawing/2014/main" val="2484121680"/>
+                  </a:ext>
+                </a:extLst>
+              </a:tr>
+            </a:tbl>
+          </a:graphicData>
+        </a:graphic>
+      </p:graphicFrame>
+      <p:sp>
+        <p:nvSpPr>
+          <p:cNvPr id="34" name="TextBox 33">
+            <a:extLst>
+              <a:ext uri="{FF2B5EF4-FFF2-40B4-BE49-F238E27FC236}">
+                <a16:creationId xmlns:a16="http://schemas.microsoft.com/office/drawing/2014/main" id="{1282BA7C-71C7-40B2-BA53-9FBA7D3FB2B1}"/>
+              </a:ext>
+            </a:extLst>
+          </p:cNvPr>
+          <p:cNvSpPr txBox="1"/>
+          <p:nvPr/>
+        </p:nvSpPr>
+        <p:spPr>
+          <a:xfrm>
+            <a:off x="1466850" y="15655597"/>
+            <a:ext cx="6155622" cy="1015663"/>
+          </a:xfrm>
+          <a:prstGeom prst="rect">
+            <a:avLst/>
+          </a:prstGeom>
+          <a:noFill/>
+        </p:spPr>
+        <p:txBody>
+          <a:bodyPr wrap="square" rtlCol="0" anchor="ctr">
+            <a:spAutoFit/>
+          </a:bodyPr>
+          <a:lstStyle/>
+          <a:p>
+            <a:pPr algn="ctr"/>
+            <a:r>
+              <a:rPr lang="en-US" sz="3000" dirty="0"/>
+              <a:t>64% of students found the Worked examples helpful. </a:t>
+            </a:r>
+          </a:p>
+        </p:txBody>
+      </p:sp>
+      <p:sp>
+        <p:nvSpPr>
+          <p:cNvPr id="35" name="Rectangle 34">
+            <a:extLst>
+              <a:ext uri="{FF2B5EF4-FFF2-40B4-BE49-F238E27FC236}">
+                <a16:creationId xmlns:a16="http://schemas.microsoft.com/office/drawing/2014/main" id="{8AC9C610-38A4-43C2-A275-EF400C3DC3A3}"/>
+              </a:ext>
+            </a:extLst>
+          </p:cNvPr>
+          <p:cNvSpPr/>
+          <p:nvPr/>
+        </p:nvSpPr>
+        <p:spPr>
+          <a:xfrm>
+            <a:off x="11816168" y="20096879"/>
+            <a:ext cx="7213600" cy="5080000"/>
+          </a:xfrm>
+          <a:prstGeom prst="rect">
+            <a:avLst/>
+          </a:prstGeom>
+        </p:spPr>
+        <p:style>
+          <a:lnRef idx="2">
+            <a:schemeClr val="accent1">
+              <a:shade val="50000"/>
+            </a:schemeClr>
+          </a:lnRef>
+          <a:fillRef idx="1">
+            <a:schemeClr val="accent1"/>
+          </a:fillRef>
+          <a:effectRef idx="0">
+            <a:schemeClr val="accent1"/>
+          </a:effectRef>
+          <a:fontRef idx="minor">
+            <a:schemeClr val="lt1"/>
+          </a:fontRef>
+        </p:style>
+        <p:txBody>
+          <a:bodyPr rtlCol="0" anchor="ctr"/>
+          <a:lstStyle/>
+          <a:p>
+            <a:pPr algn="ctr"/>
+            <a:r>
+              <a:rPr lang="en-US" sz="3600" dirty="0"/>
+              <a:t>Super Nice Visual For filtered WE Use X Prior </a:t>
+            </a:r>
+            <a:r>
+              <a:rPr lang="en-US" sz="3600" dirty="0" err="1"/>
+              <a:t>Exp</a:t>
+            </a:r>
+            <a:r>
+              <a:rPr lang="en-US" sz="3600" dirty="0"/>
+              <a:t> vs Runs</a:t>
+            </a:r>
+          </a:p>
+        </p:txBody>
+      </p:sp>
+      <p:sp>
+        <p:nvSpPr>
+          <p:cNvPr id="37" name="TextBox 36">
+            <a:extLst>
+              <a:ext uri="{FF2B5EF4-FFF2-40B4-BE49-F238E27FC236}">
+                <a16:creationId xmlns:a16="http://schemas.microsoft.com/office/drawing/2014/main" id="{29CE260E-A26D-4023-A209-60CB3A8EA37F}"/>
+              </a:ext>
+            </a:extLst>
+          </p:cNvPr>
+          <p:cNvSpPr txBox="1"/>
+          <p:nvPr/>
+        </p:nvSpPr>
+        <p:spPr>
+          <a:xfrm>
+            <a:off x="11721695" y="18541091"/>
+            <a:ext cx="7209659" cy="1477328"/>
+          </a:xfrm>
+          <a:prstGeom prst="rect">
+            <a:avLst/>
+          </a:prstGeom>
+          <a:noFill/>
+        </p:spPr>
+        <p:txBody>
+          <a:bodyPr wrap="square" rtlCol="0">
+            <a:spAutoFit/>
+          </a:bodyPr>
+          <a:lstStyle/>
+          <a:p>
+            <a:pPr algn="ctr"/>
+            <a:r>
+              <a:rPr lang="en-US" sz="3000" dirty="0"/>
+              <a:t>Students who used Wes actually completed the problem in more runs/time than those that didn’t</a:t>
+            </a:r>
+          </a:p>
+        </p:txBody>
+      </p:sp>
+      <p:sp>
+        <p:nvSpPr>
+          <p:cNvPr id="38" name="TextBox 37">
+            <a:extLst>
+              <a:ext uri="{FF2B5EF4-FFF2-40B4-BE49-F238E27FC236}">
+                <a16:creationId xmlns:a16="http://schemas.microsoft.com/office/drawing/2014/main" id="{9FEFC9BD-B0DF-4D2E-8E43-0CA5197F3AC6}"/>
+              </a:ext>
+            </a:extLst>
+          </p:cNvPr>
+          <p:cNvSpPr txBox="1"/>
+          <p:nvPr/>
+        </p:nvSpPr>
+        <p:spPr>
+          <a:xfrm>
+            <a:off x="22586971" y="13277706"/>
+            <a:ext cx="16215711" cy="553998"/>
+          </a:xfrm>
+          <a:prstGeom prst="rect">
+            <a:avLst/>
+          </a:prstGeom>
+          <a:noFill/>
+        </p:spPr>
+        <p:txBody>
+          <a:bodyPr wrap="square" rtlCol="0">
+            <a:spAutoFit/>
+          </a:bodyPr>
+          <a:lstStyle/>
+          <a:p>
+            <a:pPr algn="ctr"/>
+            <a:r>
+              <a:rPr lang="en-US" sz="3000" dirty="0"/>
+              <a:t>Sample Worked Example</a:t>
             </a:r>
           </a:p>
         </p:txBody>

</xml_diff>